<commit_message>
Reviewed and added to Test Instructions slides
</commit_message>
<xml_diff>
--- a/Assets/StreamingAssets/2D_Objects/Test/~Test Instructions.pptx
+++ b/Assets/StreamingAssets/2D_Objects/Test/~Test Instructions.pptx
@@ -270,7 +270,7 @@
           <a:p>
             <a:fld id="{43D9F887-C526-42E2-BE1C-7F1C55940A26}" type="datetimeFigureOut">
               <a:rPr lang="en-US" smtClean="0"/>
-              <a:t>6/11/2020</a:t>
+              <a:t>6/13/2020</a:t>
             </a:fld>
             <a:endParaRPr lang="en-US"/>
           </a:p>
@@ -468,7 +468,7 @@
           <a:p>
             <a:fld id="{43D9F887-C526-42E2-BE1C-7F1C55940A26}" type="datetimeFigureOut">
               <a:rPr lang="en-US" smtClean="0"/>
-              <a:t>6/11/2020</a:t>
+              <a:t>6/13/2020</a:t>
             </a:fld>
             <a:endParaRPr lang="en-US"/>
           </a:p>
@@ -676,7 +676,7 @@
           <a:p>
             <a:fld id="{43D9F887-C526-42E2-BE1C-7F1C55940A26}" type="datetimeFigureOut">
               <a:rPr lang="en-US" smtClean="0"/>
-              <a:t>6/11/2020</a:t>
+              <a:t>6/13/2020</a:t>
             </a:fld>
             <a:endParaRPr lang="en-US"/>
           </a:p>
@@ -874,7 +874,7 @@
           <a:p>
             <a:fld id="{43D9F887-C526-42E2-BE1C-7F1C55940A26}" type="datetimeFigureOut">
               <a:rPr lang="en-US" smtClean="0"/>
-              <a:t>6/11/2020</a:t>
+              <a:t>6/13/2020</a:t>
             </a:fld>
             <a:endParaRPr lang="en-US"/>
           </a:p>
@@ -1149,7 +1149,7 @@
           <a:p>
             <a:fld id="{43D9F887-C526-42E2-BE1C-7F1C55940A26}" type="datetimeFigureOut">
               <a:rPr lang="en-US" smtClean="0"/>
-              <a:t>6/11/2020</a:t>
+              <a:t>6/13/2020</a:t>
             </a:fld>
             <a:endParaRPr lang="en-US"/>
           </a:p>
@@ -1414,7 +1414,7 @@
           <a:p>
             <a:fld id="{43D9F887-C526-42E2-BE1C-7F1C55940A26}" type="datetimeFigureOut">
               <a:rPr lang="en-US" smtClean="0"/>
-              <a:t>6/11/2020</a:t>
+              <a:t>6/13/2020</a:t>
             </a:fld>
             <a:endParaRPr lang="en-US"/>
           </a:p>
@@ -1826,7 +1826,7 @@
           <a:p>
             <a:fld id="{43D9F887-C526-42E2-BE1C-7F1C55940A26}" type="datetimeFigureOut">
               <a:rPr lang="en-US" smtClean="0"/>
-              <a:t>6/11/2020</a:t>
+              <a:t>6/13/2020</a:t>
             </a:fld>
             <a:endParaRPr lang="en-US"/>
           </a:p>
@@ -1967,7 +1967,7 @@
           <a:p>
             <a:fld id="{43D9F887-C526-42E2-BE1C-7F1C55940A26}" type="datetimeFigureOut">
               <a:rPr lang="en-US" smtClean="0"/>
-              <a:t>6/11/2020</a:t>
+              <a:t>6/13/2020</a:t>
             </a:fld>
             <a:endParaRPr lang="en-US"/>
           </a:p>
@@ -2080,7 +2080,7 @@
           <a:p>
             <a:fld id="{43D9F887-C526-42E2-BE1C-7F1C55940A26}" type="datetimeFigureOut">
               <a:rPr lang="en-US" smtClean="0"/>
-              <a:t>6/11/2020</a:t>
+              <a:t>6/13/2020</a:t>
             </a:fld>
             <a:endParaRPr lang="en-US"/>
           </a:p>
@@ -2391,7 +2391,7 @@
           <a:p>
             <a:fld id="{43D9F887-C526-42E2-BE1C-7F1C55940A26}" type="datetimeFigureOut">
               <a:rPr lang="en-US" smtClean="0"/>
-              <a:t>6/11/2020</a:t>
+              <a:t>6/13/2020</a:t>
             </a:fld>
             <a:endParaRPr lang="en-US"/>
           </a:p>
@@ -2679,7 +2679,7 @@
           <a:p>
             <a:fld id="{43D9F887-C526-42E2-BE1C-7F1C55940A26}" type="datetimeFigureOut">
               <a:rPr lang="en-US" smtClean="0"/>
-              <a:t>6/11/2020</a:t>
+              <a:t>6/13/2020</a:t>
             </a:fld>
             <a:endParaRPr lang="en-US"/>
           </a:p>
@@ -2920,7 +2920,7 @@
           <a:p>
             <a:fld id="{43D9F887-C526-42E2-BE1C-7F1C55940A26}" type="datetimeFigureOut">
               <a:rPr lang="en-US" smtClean="0"/>
-              <a:t>6/11/2020</a:t>
+              <a:t>6/13/2020</a:t>
             </a:fld>
             <a:endParaRPr lang="en-US"/>
           </a:p>

</xml_diff>